<commit_message>
Update to Week3 PPT
</commit_message>
<xml_diff>
--- a/Weekly Updates/Week3.pptx
+++ b/Weekly Updates/Week3.pptx
@@ -3876,36 +3876,6 @@
           <a:chExt cx="0" cy="0"/>
         </a:xfrm>
       </p:grpSpPr>
-      <p:pic>
-        <p:nvPicPr>
-          <p:cNvPr id="14" name="Picture 13"/>
-          <p:cNvPicPr>
-            <a:picLocks noChangeAspect="1"/>
-          </p:cNvPicPr>
-          <p:nvPr/>
-        </p:nvPicPr>
-        <p:blipFill>
-          <a:blip r:embed="rId2">
-            <a:extLst>
-              <a:ext uri="{28A0092B-C50C-407E-A947-70E740481C1C}">
-                <a14:useLocalDpi xmlns:a14="http://schemas.microsoft.com/office/drawing/2010/main" val="0"/>
-              </a:ext>
-            </a:extLst>
-          </a:blip>
-          <a:stretch>
-            <a:fillRect/>
-          </a:stretch>
-        </p:blipFill>
-        <p:spPr>
-          <a:xfrm>
-            <a:off x="2766565" y="0"/>
-            <a:ext cx="6658870" cy="6858000"/>
-          </a:xfrm>
-          <a:prstGeom prst="rect">
-            <a:avLst/>
-          </a:prstGeom>
-        </p:spPr>
-      </p:pic>
     </p:spTree>
     <p:extLst>
       <p:ext uri="{BB962C8B-B14F-4D97-AF65-F5344CB8AC3E}">
@@ -3936,36 +3906,6 @@
           <a:chExt cx="0" cy="0"/>
         </a:xfrm>
       </p:grpSpPr>
-      <p:pic>
-        <p:nvPicPr>
-          <p:cNvPr id="5" name="Picture 4"/>
-          <p:cNvPicPr>
-            <a:picLocks noChangeAspect="1"/>
-          </p:cNvPicPr>
-          <p:nvPr/>
-        </p:nvPicPr>
-        <p:blipFill>
-          <a:blip r:embed="rId2">
-            <a:extLst>
-              <a:ext uri="{28A0092B-C50C-407E-A947-70E740481C1C}">
-                <a14:useLocalDpi xmlns:a14="http://schemas.microsoft.com/office/drawing/2010/main" val="0"/>
-              </a:ext>
-            </a:extLst>
-          </a:blip>
-          <a:stretch>
-            <a:fillRect/>
-          </a:stretch>
-        </p:blipFill>
-        <p:spPr>
-          <a:xfrm>
-            <a:off x="2268279" y="0"/>
-            <a:ext cx="7655442" cy="6858000"/>
-          </a:xfrm>
-          <a:prstGeom prst="rect">
-            <a:avLst/>
-          </a:prstGeom>
-        </p:spPr>
-      </p:pic>
     </p:spTree>
     <p:extLst>
       <p:ext uri="{BB962C8B-B14F-4D97-AF65-F5344CB8AC3E}">
@@ -4046,20 +3986,6 @@
             <a:normAutofit/>
           </a:bodyPr>
           <a:lstStyle/>
-          <a:p>
-            <a:pPr marL="457200" indent="-457200">
-              <a:buFont typeface="+mj-lt"/>
-              <a:buAutoNum type="arabicPeriod"/>
-            </a:pPr>
-            <a:r>
-              <a:rPr lang="en-US" dirty="0"/>
-              <a:t>Goal: make a set of all features and dimensions, then run through a DFM check function</a:t>
-            </a:r>
-          </a:p>
-          <a:p>
-            <a:pPr lvl="1"/>
-            <a:endParaRPr lang="en-US" dirty="0"/>
-          </a:p>
           <a:p>
             <a:pPr marL="514350" indent="-514350">
               <a:buFont typeface="+mj-lt"/>

</xml_diff>

<commit_message>
Updated Week 3 PPT
</commit_message>
<xml_diff>
--- a/Weekly Updates/Week3.pptx
+++ b/Weekly Updates/Week3.pptx
@@ -3359,6 +3359,10 @@
           </a:bodyPr>
           <a:lstStyle/>
           <a:p>
+            <a:r>
+              <a:rPr lang="en-US" dirty="0"/>
+              <a:t/>
+            </a:r>
             <a:br>
               <a:rPr lang="en-US" dirty="0"/>
             </a:br>
@@ -3697,7 +3701,7 @@
         <p:spPr/>
         <p:txBody>
           <a:bodyPr>
-            <a:normAutofit/>
+            <a:normAutofit fontScale="92500" lnSpcReduction="20000"/>
           </a:bodyPr>
           <a:lstStyle/>
           <a:p>
@@ -3713,21 +3717,21 @@
           <a:p>
             <a:pPr lvl="1"/>
             <a:r>
-              <a:rPr lang="en-US" dirty="0"/>
+              <a:rPr lang="en-US" sz="2200" dirty="0"/>
               <a:t>Get all features</a:t>
             </a:r>
           </a:p>
           <a:p>
             <a:pPr lvl="2"/>
             <a:r>
-              <a:rPr lang="en-US" dirty="0"/>
+              <a:rPr lang="en-US" sz="2200" dirty="0"/>
               <a:t>Get all sketches underlying each feature</a:t>
             </a:r>
           </a:p>
           <a:p>
             <a:pPr lvl="3"/>
             <a:r>
-              <a:rPr lang="en-US" dirty="0"/>
+              <a:rPr lang="en-US" sz="2200" dirty="0"/>
               <a:t>Get all pertinent dimensions of sketches and features</a:t>
             </a:r>
           </a:p>
@@ -3758,8 +3762,44 @@
             <a:pPr lvl="1"/>
             <a:r>
               <a:rPr lang="en-US" dirty="0"/>
-              <a:t>Still a lot to do in that we need to deal with many more features</a:t>
-            </a:r>
+              <a:t>Still a lot to do in that we need to deal with many more </a:t>
+            </a:r>
+            <a:r>
+              <a:rPr lang="en-US" dirty="0" smtClean="0"/>
+              <a:t>features</a:t>
+            </a:r>
+          </a:p>
+          <a:p>
+            <a:pPr lvl="1"/>
+            <a:endParaRPr lang="en-US" dirty="0"/>
+          </a:p>
+          <a:p>
+            <a:pPr marL="514350" indent="-514350">
+              <a:buFont typeface="+mj-lt"/>
+              <a:buAutoNum type="arabicPeriod"/>
+            </a:pPr>
+            <a:r>
+              <a:rPr lang="en-US" dirty="0" smtClean="0"/>
+              <a:t>Added feature-highlighting</a:t>
+            </a:r>
+          </a:p>
+          <a:p>
+            <a:pPr marL="514350" indent="-514350">
+              <a:buFont typeface="+mj-lt"/>
+              <a:buAutoNum type="arabicPeriod"/>
+            </a:pPr>
+            <a:endParaRPr lang="en-US" dirty="0"/>
+          </a:p>
+          <a:p>
+            <a:pPr marL="514350" indent="-514350">
+              <a:buFont typeface="+mj-lt"/>
+              <a:buAutoNum type="arabicPeriod"/>
+            </a:pPr>
+            <a:r>
+              <a:rPr lang="en-US" dirty="0" smtClean="0"/>
+              <a:t>Decided on new UI for setting feature tolerances</a:t>
+            </a:r>
+            <a:endParaRPr lang="en-US" dirty="0" smtClean="0"/>
           </a:p>
         </p:txBody>
       </p:sp>
@@ -3821,31 +3861,54 @@
           </a:p>
         </p:txBody>
       </p:sp>
-      <p:sp>
-        <p:nvSpPr>
-          <p:cNvPr id="5" name="Content Placeholder 4">
-            <a:extLst>
-              <a:ext uri="{FF2B5EF4-FFF2-40B4-BE49-F238E27FC236}">
-                <a16:creationId xmlns:a16="http://schemas.microsoft.com/office/drawing/2014/main" id="{D5AA2046-B305-43AC-9D16-FED98ACD8BBF}"/>
-              </a:ext>
-            </a:extLst>
-          </p:cNvPr>
-          <p:cNvSpPr>
-            <a:spLocks noGrp="1"/>
-          </p:cNvSpPr>
-          <p:nvPr>
-            <p:ph idx="1"/>
-          </p:nvPr>
-        </p:nvSpPr>
-        <p:spPr/>
-        <p:txBody>
-          <a:bodyPr/>
-          <a:lstStyle/>
-          <a:p>
-            <a:endParaRPr lang="en-US"/>
-          </a:p>
-        </p:txBody>
-      </p:sp>
+      <p:pic>
+        <p:nvPicPr>
+          <p:cNvPr id="3" name="Picture 2"/>
+          <p:cNvPicPr>
+            <a:picLocks noChangeAspect="1"/>
+          </p:cNvPicPr>
+          <p:nvPr/>
+        </p:nvPicPr>
+        <p:blipFill>
+          <a:blip r:embed="rId2"/>
+          <a:stretch>
+            <a:fillRect/>
+          </a:stretch>
+        </p:blipFill>
+        <p:spPr>
+          <a:xfrm>
+            <a:off x="0" y="2054766"/>
+            <a:ext cx="4495800" cy="3190875"/>
+          </a:xfrm>
+          <a:prstGeom prst="rect">
+            <a:avLst/>
+          </a:prstGeom>
+        </p:spPr>
+      </p:pic>
+      <p:pic>
+        <p:nvPicPr>
+          <p:cNvPr id="4" name="Picture 3"/>
+          <p:cNvPicPr>
+            <a:picLocks noChangeAspect="1"/>
+          </p:cNvPicPr>
+          <p:nvPr/>
+        </p:nvPicPr>
+        <p:blipFill>
+          <a:blip r:embed="rId3"/>
+          <a:stretch>
+            <a:fillRect/>
+          </a:stretch>
+        </p:blipFill>
+        <p:spPr>
+          <a:xfrm>
+            <a:off x="4765235" y="978568"/>
+            <a:ext cx="7426765" cy="5343273"/>
+          </a:xfrm>
+          <a:prstGeom prst="rect">
+            <a:avLst/>
+          </a:prstGeom>
+        </p:spPr>
+      </p:pic>
     </p:spTree>
     <p:extLst>
       <p:ext uri="{BB962C8B-B14F-4D97-AF65-F5344CB8AC3E}">
@@ -3876,6 +3939,30 @@
           <a:chExt cx="0" cy="0"/>
         </a:xfrm>
       </p:grpSpPr>
+      <p:pic>
+        <p:nvPicPr>
+          <p:cNvPr id="2" name="Picture 1"/>
+          <p:cNvPicPr>
+            <a:picLocks noChangeAspect="1"/>
+          </p:cNvPicPr>
+          <p:nvPr/>
+        </p:nvPicPr>
+        <p:blipFill>
+          <a:blip r:embed="rId2"/>
+          <a:stretch>
+            <a:fillRect/>
+          </a:stretch>
+        </p:blipFill>
+        <p:spPr>
+          <a:xfrm>
+            <a:off x="1068554" y="858503"/>
+            <a:ext cx="9477375" cy="5076825"/>
+          </a:xfrm>
+          <a:prstGeom prst="rect">
+            <a:avLst/>
+          </a:prstGeom>
+        </p:spPr>
+      </p:pic>
     </p:spTree>
     <p:extLst>
       <p:ext uri="{BB962C8B-B14F-4D97-AF65-F5344CB8AC3E}">
@@ -3906,6 +3993,30 @@
           <a:chExt cx="0" cy="0"/>
         </a:xfrm>
       </p:grpSpPr>
+      <p:pic>
+        <p:nvPicPr>
+          <p:cNvPr id="2" name="Picture 1"/>
+          <p:cNvPicPr>
+            <a:picLocks noChangeAspect="1"/>
+          </p:cNvPicPr>
+          <p:nvPr/>
+        </p:nvPicPr>
+        <p:blipFill>
+          <a:blip r:embed="rId2"/>
+          <a:stretch>
+            <a:fillRect/>
+          </a:stretch>
+        </p:blipFill>
+        <p:spPr>
+          <a:xfrm>
+            <a:off x="923925" y="252412"/>
+            <a:ext cx="10344150" cy="6353175"/>
+          </a:xfrm>
+          <a:prstGeom prst="rect">
+            <a:avLst/>
+          </a:prstGeom>
+        </p:spPr>
+      </p:pic>
     </p:spTree>
     <p:extLst>
       <p:ext uri="{BB962C8B-B14F-4D97-AF65-F5344CB8AC3E}">

</xml_diff>

<commit_message>
PPT Updates + Pages UI
</commit_message>
<xml_diff>
--- a/Weekly Updates/Week3.pptx
+++ b/Weekly Updates/Week3.pptx
@@ -10,12 +10,13 @@
     <p:sldId id="259" r:id="rId4"/>
     <p:sldId id="267" r:id="rId5"/>
     <p:sldId id="268" r:id="rId6"/>
-    <p:sldId id="262" r:id="rId7"/>
-    <p:sldId id="265" r:id="rId8"/>
-    <p:sldId id="260" r:id="rId9"/>
-    <p:sldId id="261" r:id="rId10"/>
-    <p:sldId id="264" r:id="rId11"/>
-    <p:sldId id="266" r:id="rId12"/>
+    <p:sldId id="269" r:id="rId7"/>
+    <p:sldId id="262" r:id="rId8"/>
+    <p:sldId id="265" r:id="rId9"/>
+    <p:sldId id="260" r:id="rId10"/>
+    <p:sldId id="261" r:id="rId11"/>
+    <p:sldId id="264" r:id="rId12"/>
+    <p:sldId id="266" r:id="rId13"/>
   </p:sldIdLst>
   <p:sldSz cx="12192000" cy="6858000"/>
   <p:notesSz cx="6858000" cy="9144000"/>
@@ -3455,6 +3456,113 @@
           <p:cNvPr id="2" name="Title 1">
             <a:extLst>
               <a:ext uri="{FF2B5EF4-FFF2-40B4-BE49-F238E27FC236}">
+                <a16:creationId xmlns:a16="http://schemas.microsoft.com/office/drawing/2014/main" id="{FFD80D3C-0DE5-4787-AD89-FCA2B073CAA9}"/>
+              </a:ext>
+            </a:extLst>
+          </p:cNvPr>
+          <p:cNvSpPr>
+            <a:spLocks noGrp="1"/>
+          </p:cNvSpPr>
+          <p:nvPr>
+            <p:ph type="title"/>
+          </p:nvPr>
+        </p:nvSpPr>
+        <p:spPr/>
+        <p:txBody>
+          <a:bodyPr/>
+          <a:lstStyle/>
+          <a:p>
+            <a:r>
+              <a:rPr lang="en-US" dirty="0"/>
+              <a:t>Problems List and Solution (Cont’d)</a:t>
+            </a:r>
+          </a:p>
+        </p:txBody>
+      </p:sp>
+      <p:sp>
+        <p:nvSpPr>
+          <p:cNvPr id="3" name="Content Placeholder 2">
+            <a:extLst>
+              <a:ext uri="{FF2B5EF4-FFF2-40B4-BE49-F238E27FC236}">
+                <a16:creationId xmlns:a16="http://schemas.microsoft.com/office/drawing/2014/main" id="{77C7C523-BD01-4F5C-ADCB-063CC6B09E70}"/>
+              </a:ext>
+            </a:extLst>
+          </p:cNvPr>
+          <p:cNvSpPr>
+            <a:spLocks noGrp="1"/>
+          </p:cNvSpPr>
+          <p:nvPr>
+            <p:ph idx="1"/>
+          </p:nvPr>
+        </p:nvSpPr>
+        <p:spPr/>
+        <p:txBody>
+          <a:bodyPr/>
+          <a:lstStyle/>
+          <a:p>
+            <a:r>
+              <a:rPr lang="en-US" dirty="0"/>
+              <a:t>Packages downloaded from GitHub do not compile because Dna.Framework is not a valid namespace</a:t>
+            </a:r>
+          </a:p>
+          <a:p>
+            <a:pPr lvl="1"/>
+            <a:r>
+              <a:rPr lang="en-US" dirty="0"/>
+              <a:t>Dna.Framework, also written by AngelSix, is a NuGet package</a:t>
+            </a:r>
+          </a:p>
+          <a:p>
+            <a:pPr lvl="1"/>
+            <a:r>
+              <a:rPr lang="en-US" dirty="0"/>
+              <a:t>NuGet is a free, open-source package manager in Visual Studio</a:t>
+            </a:r>
+          </a:p>
+          <a:p>
+            <a:pPr lvl="1"/>
+            <a:r>
+              <a:rPr lang="en-US" dirty="0"/>
+              <a:t>Make sure this package is properly installed (with dependencies) for each solution</a:t>
+            </a:r>
+          </a:p>
+        </p:txBody>
+      </p:sp>
+    </p:spTree>
+    <p:extLst>
+      <p:ext uri="{BB962C8B-B14F-4D97-AF65-F5344CB8AC3E}">
+        <p14:creationId xmlns:p14="http://schemas.microsoft.com/office/powerpoint/2010/main" val="1105893448"/>
+      </p:ext>
+    </p:extLst>
+  </p:cSld>
+  <p:clrMapOvr>
+    <a:masterClrMapping/>
+  </p:clrMapOvr>
+</p:sld>
+</file>
+
+<file path=ppt/slides/slide11.xml><?xml version="1.0" encoding="utf-8"?>
+<p:sld xmlns:a="http://schemas.openxmlformats.org/drawingml/2006/main" xmlns:r="http://schemas.openxmlformats.org/officeDocument/2006/relationships" xmlns:p="http://schemas.openxmlformats.org/presentationml/2006/main">
+  <p:cSld>
+    <p:spTree>
+      <p:nvGrpSpPr>
+        <p:cNvPr id="1" name=""/>
+        <p:cNvGrpSpPr/>
+        <p:nvPr/>
+      </p:nvGrpSpPr>
+      <p:grpSpPr>
+        <a:xfrm>
+          <a:off x="0" y="0"/>
+          <a:ext cx="0" cy="0"/>
+          <a:chOff x="0" y="0"/>
+          <a:chExt cx="0" cy="0"/>
+        </a:xfrm>
+      </p:grpSpPr>
+      <p:sp>
+        <p:nvSpPr>
+          <p:cNvPr id="2" name="Title 1">
+            <a:extLst>
+              <a:ext uri="{FF2B5EF4-FFF2-40B4-BE49-F238E27FC236}">
                 <a16:creationId xmlns:a16="http://schemas.microsoft.com/office/drawing/2014/main" id="{5EF4F688-E0AF-4FB6-89E1-31ACE46128F1}"/>
               </a:ext>
             </a:extLst>
@@ -3528,7 +3636,7 @@
 </p:sld>
 </file>
 
-<file path=ppt/slides/slide11.xml><?xml version="1.0" encoding="utf-8"?>
+<file path=ppt/slides/slide12.xml><?xml version="1.0" encoding="utf-8"?>
 <p:sld xmlns:a="http://schemas.openxmlformats.org/drawingml/2006/main" xmlns:r="http://schemas.openxmlformats.org/officeDocument/2006/relationships" xmlns:p="http://schemas.openxmlformats.org/presentationml/2006/main">
   <p:cSld>
     <p:spTree>
@@ -3799,7 +3907,6 @@
               <a:rPr lang="en-US" dirty="0" smtClean="0"/>
               <a:t>Decided on new UI for setting feature tolerances</a:t>
             </a:r>
-            <a:endParaRPr lang="en-US" dirty="0" smtClean="0"/>
           </a:p>
         </p:txBody>
       </p:sp>
@@ -4047,124 +4154,34 @@
           <a:chExt cx="0" cy="0"/>
         </a:xfrm>
       </p:grpSpPr>
-      <p:sp>
-        <p:nvSpPr>
-          <p:cNvPr id="2" name="Title 1">
-            <a:extLst>
-              <a:ext uri="{FF2B5EF4-FFF2-40B4-BE49-F238E27FC236}">
-                <a16:creationId xmlns:a16="http://schemas.microsoft.com/office/drawing/2014/main" id="{C5DAE7CA-9369-48CD-9541-C82E72C2C0C5}"/>
-              </a:ext>
-            </a:extLst>
-          </p:cNvPr>
-          <p:cNvSpPr>
-            <a:spLocks noGrp="1"/>
-          </p:cNvSpPr>
-          <p:nvPr>
-            <p:ph type="title"/>
-          </p:nvPr>
-        </p:nvSpPr>
-        <p:spPr/>
-        <p:txBody>
-          <a:bodyPr/>
-          <a:lstStyle/>
-          <a:p>
-            <a:r>
-              <a:rPr lang="en-US" dirty="0"/>
-              <a:t>Next Steps</a:t>
-            </a:r>
-          </a:p>
-        </p:txBody>
-      </p:sp>
-      <p:sp>
-        <p:nvSpPr>
-          <p:cNvPr id="3" name="Content Placeholder 2">
-            <a:extLst>
-              <a:ext uri="{FF2B5EF4-FFF2-40B4-BE49-F238E27FC236}">
-                <a16:creationId xmlns:a16="http://schemas.microsoft.com/office/drawing/2014/main" id="{D44BE787-6C9A-42E8-B9CA-921D09C037CE}"/>
-              </a:ext>
-            </a:extLst>
-          </p:cNvPr>
-          <p:cNvSpPr>
-            <a:spLocks noGrp="1"/>
-          </p:cNvSpPr>
-          <p:nvPr>
-            <p:ph idx="1"/>
-          </p:nvPr>
-        </p:nvSpPr>
-        <p:spPr/>
-        <p:txBody>
-          <a:bodyPr>
-            <a:normAutofit/>
-          </a:bodyPr>
-          <a:lstStyle/>
-          <a:p>
-            <a:pPr marL="514350" indent="-514350">
-              <a:buFont typeface="+mj-lt"/>
-              <a:buAutoNum type="arabicPeriod"/>
-            </a:pPr>
-            <a:r>
-              <a:rPr lang="en-US" dirty="0"/>
-              <a:t>Interface with </a:t>
-            </a:r>
-            <a:r>
-              <a:rPr lang="en-US" dirty="0" err="1"/>
-              <a:t>SculptPrint</a:t>
-            </a:r>
-            <a:endParaRPr lang="en-US" dirty="0"/>
-          </a:p>
-          <a:p>
-            <a:pPr lvl="1"/>
-            <a:r>
-              <a:rPr lang="en-US" dirty="0"/>
-              <a:t>Can we run a python script from within SolidWorks, or will this be external?</a:t>
-            </a:r>
-          </a:p>
-          <a:p>
-            <a:pPr lvl="1"/>
-            <a:r>
-              <a:rPr lang="en-US" dirty="0"/>
-              <a:t>Dynamically show the </a:t>
-            </a:r>
-            <a:r>
-              <a:rPr lang="en-US" dirty="0" err="1"/>
-              <a:t>SculptPrint</a:t>
-            </a:r>
-            <a:r>
-              <a:rPr lang="en-US" dirty="0"/>
-              <a:t> results in the plug-in</a:t>
-            </a:r>
-          </a:p>
-          <a:p>
-            <a:pPr lvl="1"/>
-            <a:endParaRPr lang="en-US" dirty="0"/>
-          </a:p>
-          <a:p>
-            <a:pPr marL="514350" indent="-514350">
-              <a:buFont typeface="+mj-lt"/>
-              <a:buAutoNum type="arabicPeriod"/>
-            </a:pPr>
-            <a:r>
-              <a:rPr lang="en-US" dirty="0"/>
-              <a:t>Document everything thoroughly. This project is confusing to set-up, so I will make a guide</a:t>
-            </a:r>
-          </a:p>
-          <a:p>
-            <a:pPr lvl="1"/>
-            <a:endParaRPr lang="en-US" dirty="0"/>
-          </a:p>
-          <a:p>
-            <a:pPr marL="457200" indent="-457200">
-              <a:buFont typeface="+mj-lt"/>
-              <a:buAutoNum type="arabicPeriod"/>
-            </a:pPr>
-            <a:endParaRPr lang="en-US" dirty="0"/>
-          </a:p>
-        </p:txBody>
-      </p:sp>
+      <p:pic>
+        <p:nvPicPr>
+          <p:cNvPr id="4" name="Picture 3"/>
+          <p:cNvPicPr>
+            <a:picLocks noChangeAspect="1"/>
+          </p:cNvPicPr>
+          <p:nvPr/>
+        </p:nvPicPr>
+        <p:blipFill>
+          <a:blip r:embed="rId2"/>
+          <a:stretch>
+            <a:fillRect/>
+          </a:stretch>
+        </p:blipFill>
+        <p:spPr>
+          <a:xfrm>
+            <a:off x="1547812" y="414337"/>
+            <a:ext cx="9096375" cy="6029325"/>
+          </a:xfrm>
+          <a:prstGeom prst="rect">
+            <a:avLst/>
+          </a:prstGeom>
+        </p:spPr>
+      </p:pic>
     </p:spTree>
     <p:extLst>
       <p:ext uri="{BB962C8B-B14F-4D97-AF65-F5344CB8AC3E}">
-        <p14:creationId xmlns:p14="http://schemas.microsoft.com/office/powerpoint/2010/main" val="2696789135"/>
+        <p14:creationId xmlns:p14="http://schemas.microsoft.com/office/powerpoint/2010/main" val="1581254583"/>
       </p:ext>
     </p:extLst>
   </p:cSld>
@@ -4196,7 +4213,7 @@
           <p:cNvPr id="2" name="Title 1">
             <a:extLst>
               <a:ext uri="{FF2B5EF4-FFF2-40B4-BE49-F238E27FC236}">
-                <a16:creationId xmlns:a16="http://schemas.microsoft.com/office/drawing/2014/main" id="{74D03DE4-8F63-4CF3-B2F1-D8930A138178}"/>
+                <a16:creationId xmlns:a16="http://schemas.microsoft.com/office/drawing/2014/main" id="{C5DAE7CA-9369-48CD-9541-C82E72C2C0C5}"/>
               </a:ext>
             </a:extLst>
           </p:cNvPr>
@@ -4214,55 +4231,93 @@
           <a:p>
             <a:r>
               <a:rPr lang="en-US" dirty="0"/>
-              <a:t>Quick </a:t>
-            </a:r>
-            <a:r>
-              <a:rPr lang="en-US"/>
-              <a:t>Project Decisions</a:t>
+              <a:t>Next Steps</a:t>
+            </a:r>
+          </a:p>
+        </p:txBody>
+      </p:sp>
+      <p:sp>
+        <p:nvSpPr>
+          <p:cNvPr id="3" name="Content Placeholder 2">
+            <a:extLst>
+              <a:ext uri="{FF2B5EF4-FFF2-40B4-BE49-F238E27FC236}">
+                <a16:creationId xmlns:a16="http://schemas.microsoft.com/office/drawing/2014/main" id="{D44BE787-6C9A-42E8-B9CA-921D09C037CE}"/>
+              </a:ext>
+            </a:extLst>
+          </p:cNvPr>
+          <p:cNvSpPr>
+            <a:spLocks noGrp="1"/>
+          </p:cNvSpPr>
+          <p:nvPr>
+            <p:ph idx="1"/>
+          </p:nvPr>
+        </p:nvSpPr>
+        <p:spPr/>
+        <p:txBody>
+          <a:bodyPr>
+            <a:normAutofit/>
+          </a:bodyPr>
+          <a:lstStyle/>
+          <a:p>
+            <a:pPr marL="514350" indent="-514350">
+              <a:buFont typeface="+mj-lt"/>
+              <a:buAutoNum type="arabicPeriod"/>
+            </a:pPr>
+            <a:r>
+              <a:rPr lang="en-US" dirty="0"/>
+              <a:t>Interface with </a:t>
+            </a:r>
+            <a:r>
+              <a:rPr lang="en-US" dirty="0" err="1"/>
+              <a:t>SculptPrint</a:t>
             </a:r>
             <a:endParaRPr lang="en-US" dirty="0"/>
           </a:p>
-        </p:txBody>
-      </p:sp>
-      <p:sp>
-        <p:nvSpPr>
-          <p:cNvPr id="3" name="Content Placeholder 2">
-            <a:extLst>
-              <a:ext uri="{FF2B5EF4-FFF2-40B4-BE49-F238E27FC236}">
-                <a16:creationId xmlns:a16="http://schemas.microsoft.com/office/drawing/2014/main" id="{A96EC9EA-A5D4-4E2C-BC85-CEDE3BC1F5E6}"/>
-              </a:ext>
-            </a:extLst>
-          </p:cNvPr>
-          <p:cNvSpPr>
-            <a:spLocks noGrp="1"/>
-          </p:cNvSpPr>
-          <p:nvPr>
-            <p:ph idx="1"/>
-          </p:nvPr>
-        </p:nvSpPr>
-        <p:spPr/>
-        <p:txBody>
-          <a:bodyPr/>
-          <a:lstStyle/>
-          <a:p>
+          <a:p>
+            <a:pPr lvl="1"/>
             <a:r>
               <a:rPr lang="en-US" dirty="0"/>
-              <a:t>Need a proper name and description to display in SolidWorks</a:t>
-            </a:r>
-          </a:p>
-          <a:p>
+              <a:t>Can we run a python script from within SolidWorks, or will this be external?</a:t>
+            </a:r>
+          </a:p>
+          <a:p>
+            <a:pPr lvl="1"/>
+            <a:r>
+              <a:rPr lang="en-US" dirty="0"/>
+              <a:t>Dynamically show the </a:t>
+            </a:r>
+            <a:r>
+              <a:rPr lang="en-US" dirty="0" err="1"/>
+              <a:t>SculptPrint</a:t>
+            </a:r>
+            <a:r>
+              <a:rPr lang="en-US" dirty="0"/>
+              <a:t> results in the plug-in</a:t>
+            </a:r>
+          </a:p>
+          <a:p>
+            <a:pPr lvl="1"/>
             <a:endParaRPr lang="en-US" dirty="0"/>
           </a:p>
           <a:p>
+            <a:pPr marL="514350" indent="-514350">
+              <a:buFont typeface="+mj-lt"/>
+              <a:buAutoNum type="arabicPeriod"/>
+            </a:pPr>
             <a:r>
               <a:rPr lang="en-US" dirty="0"/>
-              <a:t>Design desired interface (sketch/draw)</a:t>
-            </a:r>
-          </a:p>
-          <a:p>
+              <a:t>Document everything thoroughly. This project is confusing to set-up, so I will make a guide</a:t>
+            </a:r>
+          </a:p>
+          <a:p>
+            <a:pPr lvl="1"/>
             <a:endParaRPr lang="en-US" dirty="0"/>
           </a:p>
           <a:p>
+            <a:pPr marL="457200" indent="-457200">
+              <a:buFont typeface="+mj-lt"/>
+              <a:buAutoNum type="arabicPeriod"/>
+            </a:pPr>
             <a:endParaRPr lang="en-US" dirty="0"/>
           </a:p>
         </p:txBody>
@@ -4270,7 +4325,7 @@
     </p:spTree>
     <p:extLst>
       <p:ext uri="{BB962C8B-B14F-4D97-AF65-F5344CB8AC3E}">
-        <p14:creationId xmlns:p14="http://schemas.microsoft.com/office/powerpoint/2010/main" val="1983117304"/>
+        <p14:creationId xmlns:p14="http://schemas.microsoft.com/office/powerpoint/2010/main" val="2696789135"/>
       </p:ext>
     </p:extLst>
   </p:cSld>
@@ -4302,7 +4357,7 @@
           <p:cNvPr id="2" name="Title 1">
             <a:extLst>
               <a:ext uri="{FF2B5EF4-FFF2-40B4-BE49-F238E27FC236}">
-                <a16:creationId xmlns:a16="http://schemas.microsoft.com/office/drawing/2014/main" id="{9326EEC7-422E-4A70-8740-43F28C77C875}"/>
+                <a16:creationId xmlns:a16="http://schemas.microsoft.com/office/drawing/2014/main" id="{74D03DE4-8F63-4CF3-B2F1-D8930A138178}"/>
               </a:ext>
             </a:extLst>
           </p:cNvPr>
@@ -4320,8 +4375,13 @@
           <a:p>
             <a:r>
               <a:rPr lang="en-US" dirty="0"/>
-              <a:t>Problems List and Solution</a:t>
-            </a:r>
+              <a:t>Quick </a:t>
+            </a:r>
+            <a:r>
+              <a:rPr lang="en-US"/>
+              <a:t>Project Decisions</a:t>
+            </a:r>
+            <a:endParaRPr lang="en-US" dirty="0"/>
           </a:p>
         </p:txBody>
       </p:sp>
@@ -4330,7 +4390,7 @@
           <p:cNvPr id="3" name="Content Placeholder 2">
             <a:extLst>
               <a:ext uri="{FF2B5EF4-FFF2-40B4-BE49-F238E27FC236}">
-                <a16:creationId xmlns:a16="http://schemas.microsoft.com/office/drawing/2014/main" id="{93D28F83-2A80-45E7-A6A6-C520B1FAEE69}"/>
+                <a16:creationId xmlns:a16="http://schemas.microsoft.com/office/drawing/2014/main" id="{A96EC9EA-A5D4-4E2C-BC85-CEDE3BC1F5E6}"/>
               </a:ext>
             </a:extLst>
           </p:cNvPr>
@@ -4348,48 +4408,30 @@
           <a:p>
             <a:r>
               <a:rPr lang="en-US" dirty="0"/>
-              <a:t>AngelSix Add-In Installer returns with an error</a:t>
-            </a:r>
-          </a:p>
-          <a:p>
-            <a:pPr lvl="1"/>
+              <a:t>Need a proper name and description to display in SolidWorks</a:t>
+            </a:r>
+          </a:p>
+          <a:p>
+            <a:endParaRPr lang="en-US" dirty="0"/>
+          </a:p>
+          <a:p>
             <a:r>
               <a:rPr lang="en-US" dirty="0"/>
-              <a:t>The add-in installer runs RegAsm.exe to register your plug-in’s .</a:t>
-            </a:r>
-            <a:r>
-              <a:rPr lang="en-US" dirty="0" err="1"/>
-              <a:t>dll</a:t>
-            </a:r>
+              <a:t>Design desired interface (sketch/draw)</a:t>
+            </a:r>
+          </a:p>
+          <a:p>
             <a:endParaRPr lang="en-US" dirty="0"/>
           </a:p>
           <a:p>
-            <a:pPr lvl="1"/>
-            <a:r>
-              <a:rPr lang="en-US" dirty="0"/>
-              <a:t>Can debug manually</a:t>
-            </a:r>
-          </a:p>
-          <a:p>
-            <a:pPr lvl="1"/>
-            <a:r>
-              <a:rPr lang="en-US" dirty="0"/>
-              <a:t>cd C:\Windows\Microsoft.NET\Framework64\v4.0.30319</a:t>
-            </a:r>
-          </a:p>
-          <a:p>
-            <a:pPr lvl="1"/>
-            <a:r>
-              <a:rPr lang="en-US" dirty="0"/>
-              <a:t>RegAsm.exe /codebase "C:\Users\Aniruddh\Desktop\solidworks-api-develop\Tutorials\DynamicReload\DynamicReload\bin\Debug\DynamicReload.dll"</a:t>
-            </a:r>
+            <a:endParaRPr lang="en-US" dirty="0"/>
           </a:p>
         </p:txBody>
       </p:sp>
     </p:spTree>
     <p:extLst>
       <p:ext uri="{BB962C8B-B14F-4D97-AF65-F5344CB8AC3E}">
-        <p14:creationId xmlns:p14="http://schemas.microsoft.com/office/powerpoint/2010/main" val="1357193124"/>
+        <p14:creationId xmlns:p14="http://schemas.microsoft.com/office/powerpoint/2010/main" val="1983117304"/>
       </p:ext>
     </p:extLst>
   </p:cSld>
@@ -4421,7 +4463,7 @@
           <p:cNvPr id="2" name="Title 1">
             <a:extLst>
               <a:ext uri="{FF2B5EF4-FFF2-40B4-BE49-F238E27FC236}">
-                <a16:creationId xmlns:a16="http://schemas.microsoft.com/office/drawing/2014/main" id="{FFD80D3C-0DE5-4787-AD89-FCA2B073CAA9}"/>
+                <a16:creationId xmlns:a16="http://schemas.microsoft.com/office/drawing/2014/main" id="{9326EEC7-422E-4A70-8740-43F28C77C875}"/>
               </a:ext>
             </a:extLst>
           </p:cNvPr>
@@ -4439,7 +4481,7 @@
           <a:p>
             <a:r>
               <a:rPr lang="en-US" dirty="0"/>
-              <a:t>Problems List and Solution (Cont’d)</a:t>
+              <a:t>Problems List and Solution</a:t>
             </a:r>
           </a:p>
         </p:txBody>
@@ -4449,7 +4491,7 @@
           <p:cNvPr id="3" name="Content Placeholder 2">
             <a:extLst>
               <a:ext uri="{FF2B5EF4-FFF2-40B4-BE49-F238E27FC236}">
-                <a16:creationId xmlns:a16="http://schemas.microsoft.com/office/drawing/2014/main" id="{77C7C523-BD01-4F5C-ADCB-063CC6B09E70}"/>
+                <a16:creationId xmlns:a16="http://schemas.microsoft.com/office/drawing/2014/main" id="{93D28F83-2A80-45E7-A6A6-C520B1FAEE69}"/>
               </a:ext>
             </a:extLst>
           </p:cNvPr>
@@ -4467,28 +4509,40 @@
           <a:p>
             <a:r>
               <a:rPr lang="en-US" dirty="0"/>
-              <a:t>Packages downloaded from GitHub do not compile because Dna.Framework is not a valid namespace</a:t>
+              <a:t>AngelSix Add-In Installer returns with an error</a:t>
             </a:r>
           </a:p>
           <a:p>
             <a:pPr lvl="1"/>
             <a:r>
               <a:rPr lang="en-US" dirty="0"/>
-              <a:t>Dna.Framework, also written by AngelSix, is a NuGet package</a:t>
-            </a:r>
+              <a:t>The add-in installer runs RegAsm.exe to register your plug-in’s .</a:t>
+            </a:r>
+            <a:r>
+              <a:rPr lang="en-US" dirty="0" err="1"/>
+              <a:t>dll</a:t>
+            </a:r>
+            <a:endParaRPr lang="en-US" dirty="0"/>
           </a:p>
           <a:p>
             <a:pPr lvl="1"/>
             <a:r>
               <a:rPr lang="en-US" dirty="0"/>
-              <a:t>NuGet is a free, open-source package manager in Visual Studio</a:t>
+              <a:t>Can debug manually</a:t>
             </a:r>
           </a:p>
           <a:p>
             <a:pPr lvl="1"/>
             <a:r>
               <a:rPr lang="en-US" dirty="0"/>
-              <a:t>Make sure this package is properly installed (with dependencies) for each solution</a:t>
+              <a:t>cd C:\Windows\Microsoft.NET\Framework64\v4.0.30319</a:t>
+            </a:r>
+          </a:p>
+          <a:p>
+            <a:pPr lvl="1"/>
+            <a:r>
+              <a:rPr lang="en-US" dirty="0"/>
+              <a:t>RegAsm.exe /codebase "C:\Users\Aniruddh\Desktop\solidworks-api-develop\Tutorials\DynamicReload\DynamicReload\bin\Debug\DynamicReload.dll"</a:t>
             </a:r>
           </a:p>
         </p:txBody>
@@ -4496,7 +4550,7 @@
     </p:spTree>
     <p:extLst>
       <p:ext uri="{BB962C8B-B14F-4D97-AF65-F5344CB8AC3E}">
-        <p14:creationId xmlns:p14="http://schemas.microsoft.com/office/powerpoint/2010/main" val="1105893448"/>
+        <p14:creationId xmlns:p14="http://schemas.microsoft.com/office/powerpoint/2010/main" val="1357193124"/>
       </p:ext>
     </p:extLst>
   </p:cSld>

</xml_diff>

<commit_message>
Week 3 PPT Updates
Should work on Pages UI within WPF
</commit_message>
<xml_diff>
--- a/Weekly Updates/Week3.pptx
+++ b/Weekly Updates/Week3.pptx
@@ -3360,10 +3360,6 @@
           </a:bodyPr>
           <a:lstStyle/>
           <a:p>
-            <a:r>
-              <a:rPr lang="en-US" dirty="0"/>
-              <a:t/>
-            </a:r>
             <a:br>
               <a:rPr lang="en-US" dirty="0"/>
             </a:br>
@@ -3856,7 +3852,7 @@
             </a:pPr>
             <a:r>
               <a:rPr lang="en-US" dirty="0"/>
-              <a:t>Added feature data retrieval</a:t>
+              <a:t>Added specific feature data retrieval</a:t>
             </a:r>
           </a:p>
           <a:p>
@@ -3870,11 +3866,7 @@
             <a:pPr lvl="1"/>
             <a:r>
               <a:rPr lang="en-US" dirty="0"/>
-              <a:t>Still a lot to do in that we need to deal with many more </a:t>
-            </a:r>
-            <a:r>
-              <a:rPr lang="en-US" dirty="0" smtClean="0"/>
-              <a:t>features</a:t>
+              <a:t>Still a lot to do in that we need to deal with many more features</a:t>
             </a:r>
           </a:p>
           <a:p>
@@ -3887,8 +3879,8 @@
               <a:buAutoNum type="arabicPeriod"/>
             </a:pPr>
             <a:r>
-              <a:rPr lang="en-US" dirty="0" smtClean="0"/>
-              <a:t>Added feature-highlighting</a:t>
+              <a:rPr lang="en-US" dirty="0"/>
+              <a:t>Added feature highlighting</a:t>
             </a:r>
           </a:p>
           <a:p>
@@ -3904,7 +3896,7 @@
               <a:buAutoNum type="arabicPeriod"/>
             </a:pPr>
             <a:r>
-              <a:rPr lang="en-US" dirty="0" smtClean="0"/>
+              <a:rPr lang="en-US" dirty="0"/>
               <a:t>Decided on new UI for setting feature tolerances</a:t>
             </a:r>
           </a:p>
@@ -3984,7 +3976,7 @@
         </p:blipFill>
         <p:spPr>
           <a:xfrm>
-            <a:off x="0" y="2054766"/>
+            <a:off x="466344" y="1833562"/>
             <a:ext cx="4495800" cy="3190875"/>
           </a:xfrm>
           <a:prstGeom prst="rect">
@@ -4008,8 +4000,8 @@
         </p:blipFill>
         <p:spPr>
           <a:xfrm>
-            <a:off x="4765235" y="978568"/>
-            <a:ext cx="7426765" cy="5343273"/>
+            <a:off x="5387027" y="1056212"/>
+            <a:ext cx="6596009" cy="4745576"/>
           </a:xfrm>
           <a:prstGeom prst="rect">
             <a:avLst/>
@@ -4048,7 +4040,13 @@
       </p:grpSpPr>
       <p:pic>
         <p:nvPicPr>
-          <p:cNvPr id="2" name="Picture 1"/>
+          <p:cNvPr id="3" name="Picture 2">
+            <a:extLst>
+              <a:ext uri="{FF2B5EF4-FFF2-40B4-BE49-F238E27FC236}">
+                <a16:creationId xmlns:a16="http://schemas.microsoft.com/office/drawing/2014/main" id="{162AC3D5-F8F5-4DBC-AB2E-873C6FB135BE}"/>
+              </a:ext>
+            </a:extLst>
+          </p:cNvPr>
           <p:cNvPicPr>
             <a:picLocks noChangeAspect="1"/>
           </p:cNvPicPr>
@@ -4062,8 +4060,32 @@
         </p:blipFill>
         <p:spPr>
           <a:xfrm>
-            <a:off x="1068554" y="858503"/>
-            <a:ext cx="9477375" cy="5076825"/>
+            <a:off x="427157" y="1793854"/>
+            <a:ext cx="4607696" cy="3270292"/>
+          </a:xfrm>
+          <a:prstGeom prst="rect">
+            <a:avLst/>
+          </a:prstGeom>
+        </p:spPr>
+      </p:pic>
+      <p:pic>
+        <p:nvPicPr>
+          <p:cNvPr id="2" name="Picture 1"/>
+          <p:cNvPicPr>
+            <a:picLocks noChangeAspect="1"/>
+          </p:cNvPicPr>
+          <p:nvPr/>
+        </p:nvPicPr>
+        <p:blipFill>
+          <a:blip r:embed="rId3"/>
+          <a:stretch>
+            <a:fillRect/>
+          </a:stretch>
+        </p:blipFill>
+        <p:spPr>
+          <a:xfrm>
+            <a:off x="5246073" y="1658927"/>
+            <a:ext cx="6617093" cy="3540145"/>
           </a:xfrm>
           <a:prstGeom prst="rect">
             <a:avLst/>
@@ -4116,8 +4138,38 @@
         </p:blipFill>
         <p:spPr>
           <a:xfrm>
-            <a:off x="923925" y="252412"/>
-            <a:ext cx="10344150" cy="6353175"/>
+            <a:off x="5211097" y="1381759"/>
+            <a:ext cx="6666578" cy="4094482"/>
+          </a:xfrm>
+          <a:prstGeom prst="rect">
+            <a:avLst/>
+          </a:prstGeom>
+        </p:spPr>
+      </p:pic>
+      <p:pic>
+        <p:nvPicPr>
+          <p:cNvPr id="3" name="Picture 2">
+            <a:extLst>
+              <a:ext uri="{FF2B5EF4-FFF2-40B4-BE49-F238E27FC236}">
+                <a16:creationId xmlns:a16="http://schemas.microsoft.com/office/drawing/2014/main" id="{FD34BE83-3A87-442F-AB6D-33A6C3251787}"/>
+              </a:ext>
+            </a:extLst>
+          </p:cNvPr>
+          <p:cNvPicPr>
+            <a:picLocks noChangeAspect="1"/>
+          </p:cNvPicPr>
+          <p:nvPr/>
+        </p:nvPicPr>
+        <p:blipFill>
+          <a:blip r:embed="rId3"/>
+          <a:stretch>
+            <a:fillRect/>
+          </a:stretch>
+        </p:blipFill>
+        <p:spPr>
+          <a:xfrm>
+            <a:off x="314325" y="1833562"/>
+            <a:ext cx="4495800" cy="3190875"/>
           </a:xfrm>
           <a:prstGeom prst="rect">
             <a:avLst/>
@@ -4409,15 +4461,6 @@
             <a:r>
               <a:rPr lang="en-US" dirty="0"/>
               <a:t>Need a proper name and description to display in SolidWorks</a:t>
-            </a:r>
-          </a:p>
-          <a:p>
-            <a:endParaRPr lang="en-US" dirty="0"/>
-          </a:p>
-          <a:p>
-            <a:r>
-              <a:rPr lang="en-US" dirty="0"/>
-              <a:t>Design desired interface (sketch/draw)</a:t>
             </a:r>
           </a:p>
           <a:p>

</xml_diff>

<commit_message>
Week 3 PPT Final
On to week 4!
</commit_message>
<xml_diff>
--- a/Weekly Updates/Week3.pptx
+++ b/Weekly Updates/Week3.pptx
@@ -270,7 +270,7 @@
           <a:p>
             <a:fld id="{8CFAD378-7451-4777-A831-E1432E1A94CB}" type="datetimeFigureOut">
               <a:rPr lang="en-US" smtClean="0"/>
-              <a:t>6/18/2018</a:t>
+              <a:t>6/19/2018</a:t>
             </a:fld>
             <a:endParaRPr lang="en-US"/>
           </a:p>
@@ -468,7 +468,7 @@
           <a:p>
             <a:fld id="{8CFAD378-7451-4777-A831-E1432E1A94CB}" type="datetimeFigureOut">
               <a:rPr lang="en-US" smtClean="0"/>
-              <a:t>6/18/2018</a:t>
+              <a:t>6/19/2018</a:t>
             </a:fld>
             <a:endParaRPr lang="en-US"/>
           </a:p>
@@ -676,7 +676,7 @@
           <a:p>
             <a:fld id="{8CFAD378-7451-4777-A831-E1432E1A94CB}" type="datetimeFigureOut">
               <a:rPr lang="en-US" smtClean="0"/>
-              <a:t>6/18/2018</a:t>
+              <a:t>6/19/2018</a:t>
             </a:fld>
             <a:endParaRPr lang="en-US"/>
           </a:p>
@@ -874,7 +874,7 @@
           <a:p>
             <a:fld id="{8CFAD378-7451-4777-A831-E1432E1A94CB}" type="datetimeFigureOut">
               <a:rPr lang="en-US" smtClean="0"/>
-              <a:t>6/18/2018</a:t>
+              <a:t>6/19/2018</a:t>
             </a:fld>
             <a:endParaRPr lang="en-US"/>
           </a:p>
@@ -1149,7 +1149,7 @@
           <a:p>
             <a:fld id="{8CFAD378-7451-4777-A831-E1432E1A94CB}" type="datetimeFigureOut">
               <a:rPr lang="en-US" smtClean="0"/>
-              <a:t>6/18/2018</a:t>
+              <a:t>6/19/2018</a:t>
             </a:fld>
             <a:endParaRPr lang="en-US"/>
           </a:p>
@@ -1414,7 +1414,7 @@
           <a:p>
             <a:fld id="{8CFAD378-7451-4777-A831-E1432E1A94CB}" type="datetimeFigureOut">
               <a:rPr lang="en-US" smtClean="0"/>
-              <a:t>6/18/2018</a:t>
+              <a:t>6/19/2018</a:t>
             </a:fld>
             <a:endParaRPr lang="en-US"/>
           </a:p>
@@ -1826,7 +1826,7 @@
           <a:p>
             <a:fld id="{8CFAD378-7451-4777-A831-E1432E1A94CB}" type="datetimeFigureOut">
               <a:rPr lang="en-US" smtClean="0"/>
-              <a:t>6/18/2018</a:t>
+              <a:t>6/19/2018</a:t>
             </a:fld>
             <a:endParaRPr lang="en-US"/>
           </a:p>
@@ -1967,7 +1967,7 @@
           <a:p>
             <a:fld id="{8CFAD378-7451-4777-A831-E1432E1A94CB}" type="datetimeFigureOut">
               <a:rPr lang="en-US" smtClean="0"/>
-              <a:t>6/18/2018</a:t>
+              <a:t>6/19/2018</a:t>
             </a:fld>
             <a:endParaRPr lang="en-US"/>
           </a:p>
@@ -2080,7 +2080,7 @@
           <a:p>
             <a:fld id="{8CFAD378-7451-4777-A831-E1432E1A94CB}" type="datetimeFigureOut">
               <a:rPr lang="en-US" smtClean="0"/>
-              <a:t>6/18/2018</a:t>
+              <a:t>6/19/2018</a:t>
             </a:fld>
             <a:endParaRPr lang="en-US"/>
           </a:p>
@@ -2391,7 +2391,7 @@
           <a:p>
             <a:fld id="{8CFAD378-7451-4777-A831-E1432E1A94CB}" type="datetimeFigureOut">
               <a:rPr lang="en-US" smtClean="0"/>
-              <a:t>6/18/2018</a:t>
+              <a:t>6/19/2018</a:t>
             </a:fld>
             <a:endParaRPr lang="en-US"/>
           </a:p>
@@ -2679,7 +2679,7 @@
           <a:p>
             <a:fld id="{8CFAD378-7451-4777-A831-E1432E1A94CB}" type="datetimeFigureOut">
               <a:rPr lang="en-US" smtClean="0"/>
-              <a:t>6/18/2018</a:t>
+              <a:t>6/19/2018</a:t>
             </a:fld>
             <a:endParaRPr lang="en-US"/>
           </a:p>
@@ -2920,7 +2920,7 @@
           <a:p>
             <a:fld id="{8CFAD378-7451-4777-A831-E1432E1A94CB}" type="datetimeFigureOut">
               <a:rPr lang="en-US" smtClean="0"/>
-              <a:t>6/18/2018</a:t>
+              <a:t>6/19/2018</a:t>
             </a:fld>
             <a:endParaRPr lang="en-US"/>
           </a:p>
@@ -3360,6 +3360,10 @@
           </a:bodyPr>
           <a:lstStyle/>
           <a:p>
+            <a:r>
+              <a:rPr lang="en-US" dirty="0"/>
+              <a:t/>
+            </a:r>
             <a:br>
               <a:rPr lang="en-US" dirty="0"/>
             </a:br>
@@ -3932,34 +3936,6 @@
           <a:chExt cx="0" cy="0"/>
         </a:xfrm>
       </p:grpSpPr>
-      <p:sp>
-        <p:nvSpPr>
-          <p:cNvPr id="2" name="Title 1">
-            <a:extLst>
-              <a:ext uri="{FF2B5EF4-FFF2-40B4-BE49-F238E27FC236}">
-                <a16:creationId xmlns:a16="http://schemas.microsoft.com/office/drawing/2014/main" id="{945EA6E7-C044-4E49-92C2-E49C8A37DDC8}"/>
-              </a:ext>
-            </a:extLst>
-          </p:cNvPr>
-          <p:cNvSpPr>
-            <a:spLocks noGrp="1"/>
-          </p:cNvSpPr>
-          <p:nvPr>
-            <p:ph type="title"/>
-          </p:nvPr>
-        </p:nvSpPr>
-        <p:spPr/>
-        <p:txBody>
-          <a:bodyPr/>
-          <a:lstStyle/>
-          <a:p>
-            <a:r>
-              <a:rPr lang="en-US" dirty="0"/>
-              <a:t>Demo</a:t>
-            </a:r>
-          </a:p>
-        </p:txBody>
-      </p:sp>
       <p:pic>
         <p:nvPicPr>
           <p:cNvPr id="3" name="Picture 2"/>
@@ -4208,22 +4184,28 @@
       </p:grpSpPr>
       <p:pic>
         <p:nvPicPr>
-          <p:cNvPr id="4" name="Picture 3"/>
+          <p:cNvPr id="3" name="Picture 2"/>
           <p:cNvPicPr>
             <a:picLocks noChangeAspect="1"/>
           </p:cNvPicPr>
           <p:nvPr/>
         </p:nvPicPr>
         <p:blipFill>
-          <a:blip r:embed="rId2"/>
+          <a:blip r:embed="rId2">
+            <a:extLst>
+              <a:ext uri="{28A0092B-C50C-407E-A947-70E740481C1C}">
+                <a14:useLocalDpi xmlns:a14="http://schemas.microsoft.com/office/drawing/2010/main" val="0"/>
+              </a:ext>
+            </a:extLst>
+          </a:blip>
           <a:stretch>
             <a:fillRect/>
           </a:stretch>
         </p:blipFill>
         <p:spPr>
           <a:xfrm>
-            <a:off x="1547812" y="414337"/>
-            <a:ext cx="9096375" cy="6029325"/>
+            <a:off x="1167788" y="160989"/>
+            <a:ext cx="9911151" cy="6476673"/>
           </a:xfrm>
           <a:prstGeom prst="rect">
             <a:avLst/>
@@ -4328,9 +4310,33 @@
           <a:p>
             <a:pPr lvl="1"/>
             <a:r>
+              <a:rPr lang="en-US" dirty="0" smtClean="0"/>
+              <a:t>We can run a python </a:t>
+            </a:r>
+            <a:r>
               <a:rPr lang="en-US" dirty="0"/>
-              <a:t>Can we run a python script from within SolidWorks, or will this be external?</a:t>
-            </a:r>
+              <a:t>script from within </a:t>
+            </a:r>
+            <a:r>
+              <a:rPr lang="en-US" dirty="0" smtClean="0"/>
+              <a:t>C#</a:t>
+            </a:r>
+          </a:p>
+          <a:p>
+            <a:pPr lvl="2"/>
+            <a:r>
+              <a:rPr lang="en-US" dirty="0" smtClean="0"/>
+              <a:t>Experiment with this, and with finding an automatic </a:t>
+            </a:r>
+            <a:r>
+              <a:rPr lang="en-US" dirty="0" err="1" smtClean="0"/>
+              <a:t>fixturing</a:t>
+            </a:r>
+            <a:r>
+              <a:rPr lang="en-US" dirty="0" smtClean="0"/>
+              <a:t> process</a:t>
+            </a:r>
+            <a:endParaRPr lang="en-US" dirty="0"/>
           </a:p>
           <a:p>
             <a:pPr lvl="1"/>
@@ -4344,8 +4350,20 @@
             </a:r>
             <a:r>
               <a:rPr lang="en-US" dirty="0"/>
-              <a:t> results in the plug-in</a:t>
-            </a:r>
+              <a:t> results in the </a:t>
+            </a:r>
+            <a:r>
+              <a:rPr lang="en-US" dirty="0" smtClean="0"/>
+              <a:t>plug-in</a:t>
+            </a:r>
+          </a:p>
+          <a:p>
+            <a:pPr lvl="2"/>
+            <a:r>
+              <a:rPr lang="en-US" dirty="0" smtClean="0"/>
+              <a:t>This might involve network communications and another computer</a:t>
+            </a:r>
+            <a:endParaRPr lang="en-US" dirty="0"/>
           </a:p>
           <a:p>
             <a:pPr lvl="1"/>

</xml_diff>